<commit_message>
Fixed agent, added colab cell to notebooks, added changes made to slides.
</commit_message>
<xml_diff>
--- a/Slides/4_SMLandQuantization.pptx
+++ b/Slides/4_SMLandQuantization.pptx
@@ -207,7 +207,7 @@
           <a:p>
             <a:fld id="{9A3F7785-0B8E-DB48-AD24-94D16CEA6672}" type="datetimeFigureOut">
               <a:rPr lang="en-US" smtClean="0"/>
-              <a:t>2/25/24</a:t>
+              <a:t>2/26/24</a:t>
             </a:fld>
             <a:endParaRPr lang="en-US"/>
           </a:p>
@@ -2046,7 +2046,7 @@
           <a:p>
             <a:fld id="{8EFCB6B6-D1D9-3F4C-9FD7-9F220F5CEE19}" type="datetimeFigureOut">
               <a:rPr lang="en-US" smtClean="0"/>
-              <a:t>2/25/24</a:t>
+              <a:t>2/26/24</a:t>
             </a:fld>
             <a:endParaRPr lang="en-US"/>
           </a:p>
@@ -2246,7 +2246,7 @@
           <a:p>
             <a:fld id="{8EFCB6B6-D1D9-3F4C-9FD7-9F220F5CEE19}" type="datetimeFigureOut">
               <a:rPr lang="en-US" smtClean="0"/>
-              <a:t>2/25/24</a:t>
+              <a:t>2/26/24</a:t>
             </a:fld>
             <a:endParaRPr lang="en-US"/>
           </a:p>
@@ -2456,7 +2456,7 @@
           <a:p>
             <a:fld id="{8EFCB6B6-D1D9-3F4C-9FD7-9F220F5CEE19}" type="datetimeFigureOut">
               <a:rPr lang="en-US" smtClean="0"/>
-              <a:t>2/25/24</a:t>
+              <a:t>2/26/24</a:t>
             </a:fld>
             <a:endParaRPr lang="en-US"/>
           </a:p>
@@ -3379,7 +3379,7 @@
           <a:p>
             <a:fld id="{8EFCB6B6-D1D9-3F4C-9FD7-9F220F5CEE19}" type="datetimeFigureOut">
               <a:rPr lang="en-US" smtClean="0"/>
-              <a:t>2/25/24</a:t>
+              <a:t>2/26/24</a:t>
             </a:fld>
             <a:endParaRPr lang="en-US"/>
           </a:p>
@@ -3655,7 +3655,7 @@
           <a:p>
             <a:fld id="{8EFCB6B6-D1D9-3F4C-9FD7-9F220F5CEE19}" type="datetimeFigureOut">
               <a:rPr lang="en-US" smtClean="0"/>
-              <a:t>2/25/24</a:t>
+              <a:t>2/26/24</a:t>
             </a:fld>
             <a:endParaRPr lang="en-US"/>
           </a:p>
@@ -3923,7 +3923,7 @@
           <a:p>
             <a:fld id="{8EFCB6B6-D1D9-3F4C-9FD7-9F220F5CEE19}" type="datetimeFigureOut">
               <a:rPr lang="en-US" smtClean="0"/>
-              <a:t>2/25/24</a:t>
+              <a:t>2/26/24</a:t>
             </a:fld>
             <a:endParaRPr lang="en-US"/>
           </a:p>
@@ -4338,7 +4338,7 @@
           <a:p>
             <a:fld id="{8EFCB6B6-D1D9-3F4C-9FD7-9F220F5CEE19}" type="datetimeFigureOut">
               <a:rPr lang="en-US" smtClean="0"/>
-              <a:t>2/25/24</a:t>
+              <a:t>2/26/24</a:t>
             </a:fld>
             <a:endParaRPr lang="en-US"/>
           </a:p>
@@ -4480,7 +4480,7 @@
           <a:p>
             <a:fld id="{8EFCB6B6-D1D9-3F4C-9FD7-9F220F5CEE19}" type="datetimeFigureOut">
               <a:rPr lang="en-US" smtClean="0"/>
-              <a:t>2/25/24</a:t>
+              <a:t>2/26/24</a:t>
             </a:fld>
             <a:endParaRPr lang="en-US"/>
           </a:p>
@@ -4593,7 +4593,7 @@
           <a:p>
             <a:fld id="{8EFCB6B6-D1D9-3F4C-9FD7-9F220F5CEE19}" type="datetimeFigureOut">
               <a:rPr lang="en-US" smtClean="0"/>
-              <a:t>2/25/24</a:t>
+              <a:t>2/26/24</a:t>
             </a:fld>
             <a:endParaRPr lang="en-US"/>
           </a:p>
@@ -4906,7 +4906,7 @@
           <a:p>
             <a:fld id="{8EFCB6B6-D1D9-3F4C-9FD7-9F220F5CEE19}" type="datetimeFigureOut">
               <a:rPr lang="en-US" smtClean="0"/>
-              <a:t>2/25/24</a:t>
+              <a:t>2/26/24</a:t>
             </a:fld>
             <a:endParaRPr lang="en-US"/>
           </a:p>
@@ -5195,7 +5195,7 @@
           <a:p>
             <a:fld id="{8EFCB6B6-D1D9-3F4C-9FD7-9F220F5CEE19}" type="datetimeFigureOut">
               <a:rPr lang="en-US" smtClean="0"/>
-              <a:t>2/25/24</a:t>
+              <a:t>2/26/24</a:t>
             </a:fld>
             <a:endParaRPr lang="en-US"/>
           </a:p>
@@ -5438,7 +5438,7 @@
           <a:p>
             <a:fld id="{8EFCB6B6-D1D9-3F4C-9FD7-9F220F5CEE19}" type="datetimeFigureOut">
               <a:rPr lang="en-US" smtClean="0"/>
-              <a:t>2/25/24</a:t>
+              <a:t>2/26/24</a:t>
             </a:fld>
             <a:endParaRPr lang="en-US"/>
           </a:p>
@@ -5888,7 +5888,13 @@
           <a:p>
             <a:r>
               <a:rPr lang="en-GB" dirty="0"/>
-              <a:t>Small Language Models</a:t>
+              <a:t>Small Language Models &amp;</a:t>
+            </a:r>
+          </a:p>
+          <a:p>
+            <a:r>
+              <a:rPr lang="en-GB" dirty="0"/>
+              <a:t>Evaluation</a:t>
             </a:r>
           </a:p>
         </p:txBody>
@@ -6607,7 +6613,7 @@
               <a:buNone/>
             </a:pPr>
             <a:r>
-              <a:rPr lang="en-US" sz="3600" b="1" i="1" dirty="0">
+              <a:rPr lang="en-US" sz="3200" b="1" i="1" dirty="0">
                 <a:solidFill>
                   <a:srgbClr val="404040"/>
                 </a:solidFill>

</xml_diff>